<commit_message>
fixed presentation again :-(
</commit_message>
<xml_diff>
--- a/Presentation/Detalus vaizdų panašumas naudojant trejetų tinklus.pptx
+++ b/Presentation/Detalus vaizdų panašumas naudojant trejetų tinklus.pptx
@@ -7582,7 +7582,7 @@
           <a:p>
             <a:fld id="{062DAAF0-37C3-4118-BE27-226A6950D354}" type="datetimeFigureOut">
               <a:rPr lang="en-US" smtClean="0"/>
-              <a:t>2/17/2020</a:t>
+              <a:t>2/18/2020</a:t>
             </a:fld>
             <a:endParaRPr lang="en-US"/>
           </a:p>
@@ -7780,7 +7780,7 @@
           <a:p>
             <a:fld id="{062DAAF0-37C3-4118-BE27-226A6950D354}" type="datetimeFigureOut">
               <a:rPr lang="en-US" smtClean="0"/>
-              <a:t>2/17/2020</a:t>
+              <a:t>2/18/2020</a:t>
             </a:fld>
             <a:endParaRPr lang="en-US"/>
           </a:p>
@@ -8192,7 +8192,7 @@
           <a:p>
             <a:fld id="{062DAAF0-37C3-4118-BE27-226A6950D354}" type="datetimeFigureOut">
               <a:rPr lang="en-US" smtClean="0"/>
-              <a:t>2/17/2020</a:t>
+              <a:t>2/18/2020</a:t>
             </a:fld>
             <a:endParaRPr lang="en-US"/>
           </a:p>
@@ -24701,7 +24701,7 @@
             </a:r>
             <a:r>
               <a:rPr lang="lt-LT" sz="3400" dirty="0"/>
-              <a:t>žinimo tikslumo su duomenų rinkiniu – CUHK01.</a:t>
+              <a:t>žinimo tikslumą su duomenų rinkiniu – CUHK01.</a:t>
             </a:r>
           </a:p>
           <a:p>
@@ -24842,7 +24842,7 @@
             </a:pPr>
             <a:r>
               <a:rPr lang="lt-LT" sz="2800" dirty="0"/>
-              <a:t>Pasirinktas trejetų tinklų modelis parodė neblogus rezultatus identifikuojant žmonių eisenos kadrus. 85.7</a:t>
+              <a:t>Pasirinktas trejetų tinklų modelis parodė neblogus rezultatus identifikuojant žmonių eisenos kadrus. Užfiksuotas 85.7</a:t>
             </a:r>
             <a:r>
               <a:rPr lang="en-US" sz="2800" dirty="0"/>
@@ -25226,9 +25226,36 @@
             </a:pPr>
             <a:r>
               <a:rPr lang="lt-LT" sz="2800" dirty="0"/>
-              <a:t>Šio darbo tikslas yra pasiūlyti pasirinktą trejetų tinklų modelį, kuris sugebėtų atpažinti žmonių siluetus, ir išskiriant metrikas, palyginti su kitais rinkoje esančiais neuroninių tinklų modeliais.</a:t>
+              <a:t>Šio darbo tikslas yra pasiūlyti pasirinktą trejetų tinklų modelį, kuris sugebėtų atpažinti žmonių siluetus, ir išskiriant metrikas, palyginti su kitais rinkoje esančiais neuroninių tinklų modeliais</a:t>
             </a:r>
-            <a:endParaRPr lang="en-US" sz="2800" dirty="0"/>
+            <a:r>
+              <a:rPr lang="en-US" sz="2800" dirty="0"/>
+              <a:t>. </a:t>
+            </a:r>
+            <a:r>
+              <a:rPr lang="en-US" sz="2800" dirty="0" err="1"/>
+              <a:t>Paanalizuoti</a:t>
+            </a:r>
+            <a:r>
+              <a:rPr lang="en-US" sz="2800" dirty="0"/>
+              <a:t> </a:t>
+            </a:r>
+            <a:r>
+              <a:rPr lang="en-US" sz="2800" dirty="0" err="1"/>
+              <a:t>gautus</a:t>
+            </a:r>
+            <a:r>
+              <a:rPr lang="en-US" sz="2800" dirty="0"/>
+              <a:t> </a:t>
+            </a:r>
+            <a:r>
+              <a:rPr lang="en-US" sz="2800" dirty="0" err="1"/>
+              <a:t>rezultatus</a:t>
+            </a:r>
+            <a:r>
+              <a:rPr lang="en-US" sz="2800" dirty="0"/>
+              <a:t>.</a:t>
+            </a:r>
           </a:p>
         </p:txBody>
       </p:sp>
@@ -25864,7 +25891,19 @@
             </a:pPr>
             <a:r>
               <a:rPr lang="lt-LT" sz="2800" dirty="0"/>
-              <a:t>Šiame darbe buvo naudojama tikslumo metrikos, kuri yra naudojama </a:t>
+              <a:t>Šiame darbe buvo naudojama tikslumo </a:t>
+            </a:r>
+            <a:r>
+              <a:rPr lang="lt-LT" sz="2800" dirty="0" err="1"/>
+              <a:t>metrik</a:t>
+            </a:r>
+            <a:r>
+              <a:rPr lang="en-US" sz="2800" dirty="0"/>
+              <a:t>a</a:t>
+            </a:r>
+            <a:r>
+              <a:rPr lang="lt-LT" sz="2800" dirty="0"/>
+              <a:t>, kuri yra naudojama </a:t>
             </a:r>
             <a:r>
               <a:rPr lang="lt-LT" sz="2800" dirty="0" err="1"/>
@@ -25875,19 +25914,18 @@
               <a:t> klasifikatorių vertinime</a:t>
             </a:r>
             <a:r>
-              <a:rPr lang="en-US" sz="2800"/>
+              <a:rPr lang="en-US" sz="2800" dirty="0"/>
               <a:t>.</a:t>
             </a:r>
-            <a:endParaRPr lang="en-US" sz="2800" dirty="0"/>
           </a:p>
         </p:txBody>
       </p:sp>
       <p:pic>
         <p:nvPicPr>
-          <p:cNvPr id="4" name="Picture 3">
+          <p:cNvPr id="5" name="Picture 4">
             <a:extLst>
               <a:ext uri="{FF2B5EF4-FFF2-40B4-BE49-F238E27FC236}">
-                <a16:creationId xmlns:a16="http://schemas.microsoft.com/office/drawing/2014/main" id="{90E97747-88AF-4BD6-9135-8CEE96E1BF81}"/>
+                <a16:creationId xmlns:a16="http://schemas.microsoft.com/office/drawing/2014/main" id="{794038D1-1C84-4318-93D5-3E2F05BB6755}"/>
               </a:ext>
             </a:extLst>
           </p:cNvPr>
@@ -25904,8 +25942,8 @@
         </p:blipFill>
         <p:spPr>
           <a:xfrm>
-            <a:off x="1833563" y="3429000"/>
-            <a:ext cx="6862078" cy="1290673"/>
+            <a:off x="1734282" y="3609975"/>
+            <a:ext cx="5973201" cy="1695450"/>
           </a:xfrm>
           <a:prstGeom prst="rect">
             <a:avLst/>
@@ -26057,7 +26095,7 @@
             </a:r>
             <a:r>
               <a:rPr lang="lt-LT" sz="2800" dirty="0"/>
-              <a:t> karkasą, pačio modelio kodo bazė – </a:t>
+              <a:t> karkasą, modelio kodo bazė – </a:t>
             </a:r>
             <a:r>
               <a:rPr lang="lt-LT" sz="2800" dirty="0" err="1"/>

</xml_diff>